<commit_message>
Added some classes to C# server, and modified documents
</commit_message>
<xml_diff>
--- a/문서/개요.pptx
+++ b/문서/개요.pptx
@@ -3954,7 +3954,18 @@
                   <a:schemeClr val="tx1"/>
                 </a:solidFill>
               </a:rPr>
-              <a:t>Win 32 API</a:t>
+              <a:t>Utilities</a:t>
+            </a:r>
+          </a:p>
+          <a:p>
+            <a:pPr algn="ctr"/>
+            <a:r>
+              <a:rPr lang="en-US" altLang="ko-KR" dirty="0" smtClean="0">
+                <a:solidFill>
+                  <a:schemeClr val="tx1"/>
+                </a:solidFill>
+              </a:rPr>
+              <a:t>(Include Win 32 API)</a:t>
             </a:r>
             <a:endParaRPr lang="ko-KR" altLang="en-US" dirty="0">
               <a:solidFill>
@@ -4961,15 +4972,7 @@
                   <a:schemeClr val="tx1"/>
                 </a:solidFill>
               </a:rPr>
-              <a:t>Page </a:t>
-            </a:r>
-            <a:r>
-              <a:rPr lang="en-US" altLang="ko-KR" dirty="0" smtClean="0">
-                <a:solidFill>
-                  <a:schemeClr val="tx1"/>
-                </a:solidFill>
-              </a:rPr>
-              <a:t>Setter</a:t>
+              <a:t>Page Setter</a:t>
             </a:r>
             <a:endParaRPr lang="ko-KR" altLang="en-US" dirty="0">
               <a:solidFill>
@@ -5029,15 +5032,7 @@
                   <a:schemeClr val="tx1"/>
                 </a:solidFill>
               </a:rPr>
-              <a:t>Screen </a:t>
-            </a:r>
-            <a:r>
-              <a:rPr lang="en-US" altLang="ko-KR" dirty="0" smtClean="0">
-                <a:solidFill>
-                  <a:schemeClr val="tx1"/>
-                </a:solidFill>
-              </a:rPr>
-              <a:t>Getter</a:t>
+              <a:t>Screen Getter</a:t>
             </a:r>
             <a:endParaRPr lang="ko-KR" altLang="en-US" dirty="0">
               <a:solidFill>
@@ -5810,7 +5805,7 @@
                   <a:schemeClr val="tx1"/>
                 </a:solidFill>
               </a:rPr>
-              <a:t>Win 32 API</a:t>
+              <a:t>Utilities</a:t>
             </a:r>
             <a:endParaRPr lang="ko-KR" altLang="en-US" dirty="0">
               <a:solidFill>
@@ -6053,15 +6048,7 @@
                   <a:schemeClr val="tx1"/>
                 </a:solidFill>
               </a:rPr>
-              <a:t>Page </a:t>
-            </a:r>
-            <a:r>
-              <a:rPr lang="en-US" altLang="ko-KR" dirty="0" smtClean="0">
-                <a:solidFill>
-                  <a:schemeClr val="tx1"/>
-                </a:solidFill>
-              </a:rPr>
-              <a:t>Setter</a:t>
+              <a:t>Page Setter</a:t>
             </a:r>
             <a:endParaRPr lang="ko-KR" altLang="en-US" dirty="0">
               <a:solidFill>
@@ -6121,15 +6108,7 @@
                   <a:schemeClr val="tx1"/>
                 </a:solidFill>
               </a:rPr>
-              <a:t>Screen </a:t>
-            </a:r>
-            <a:r>
-              <a:rPr lang="en-US" altLang="ko-KR" dirty="0" smtClean="0">
-                <a:solidFill>
-                  <a:schemeClr val="tx1"/>
-                </a:solidFill>
-              </a:rPr>
-              <a:t>Getter</a:t>
+              <a:t>Screen Getter</a:t>
             </a:r>
             <a:endParaRPr lang="ko-KR" altLang="en-US" dirty="0">
               <a:solidFill>

</xml_diff>

<commit_message>
Revert "Added some classes to C# server, and modified documents"
This reverts commit 1c69553237354def1e7b5417d946c7834d8fc663.
</commit_message>
<xml_diff>
--- a/문서/개요.pptx
+++ b/문서/개요.pptx
@@ -3954,18 +3954,7 @@
                   <a:schemeClr val="tx1"/>
                 </a:solidFill>
               </a:rPr>
-              <a:t>Utilities</a:t>
-            </a:r>
-          </a:p>
-          <a:p>
-            <a:pPr algn="ctr"/>
-            <a:r>
-              <a:rPr lang="en-US" altLang="ko-KR" dirty="0" smtClean="0">
-                <a:solidFill>
-                  <a:schemeClr val="tx1"/>
-                </a:solidFill>
-              </a:rPr>
-              <a:t>(Include Win 32 API)</a:t>
+              <a:t>Win 32 API</a:t>
             </a:r>
             <a:endParaRPr lang="ko-KR" altLang="en-US" dirty="0">
               <a:solidFill>
@@ -4972,7 +4961,15 @@
                   <a:schemeClr val="tx1"/>
                 </a:solidFill>
               </a:rPr>
-              <a:t>Page Setter</a:t>
+              <a:t>Page </a:t>
+            </a:r>
+            <a:r>
+              <a:rPr lang="en-US" altLang="ko-KR" dirty="0" smtClean="0">
+                <a:solidFill>
+                  <a:schemeClr val="tx1"/>
+                </a:solidFill>
+              </a:rPr>
+              <a:t>Setter</a:t>
             </a:r>
             <a:endParaRPr lang="ko-KR" altLang="en-US" dirty="0">
               <a:solidFill>
@@ -5032,7 +5029,15 @@
                   <a:schemeClr val="tx1"/>
                 </a:solidFill>
               </a:rPr>
-              <a:t>Screen Getter</a:t>
+              <a:t>Screen </a:t>
+            </a:r>
+            <a:r>
+              <a:rPr lang="en-US" altLang="ko-KR" dirty="0" smtClean="0">
+                <a:solidFill>
+                  <a:schemeClr val="tx1"/>
+                </a:solidFill>
+              </a:rPr>
+              <a:t>Getter</a:t>
             </a:r>
             <a:endParaRPr lang="ko-KR" altLang="en-US" dirty="0">
               <a:solidFill>
@@ -5805,7 +5810,7 @@
                   <a:schemeClr val="tx1"/>
                 </a:solidFill>
               </a:rPr>
-              <a:t>Utilities</a:t>
+              <a:t>Win 32 API</a:t>
             </a:r>
             <a:endParaRPr lang="ko-KR" altLang="en-US" dirty="0">
               <a:solidFill>
@@ -6048,7 +6053,15 @@
                   <a:schemeClr val="tx1"/>
                 </a:solidFill>
               </a:rPr>
-              <a:t>Page Setter</a:t>
+              <a:t>Page </a:t>
+            </a:r>
+            <a:r>
+              <a:rPr lang="en-US" altLang="ko-KR" dirty="0" smtClean="0">
+                <a:solidFill>
+                  <a:schemeClr val="tx1"/>
+                </a:solidFill>
+              </a:rPr>
+              <a:t>Setter</a:t>
             </a:r>
             <a:endParaRPr lang="ko-KR" altLang="en-US" dirty="0">
               <a:solidFill>
@@ -6108,7 +6121,15 @@
                   <a:schemeClr val="tx1"/>
                 </a:solidFill>
               </a:rPr>
-              <a:t>Screen Getter</a:t>
+              <a:t>Screen </a:t>
+            </a:r>
+            <a:r>
+              <a:rPr lang="en-US" altLang="ko-KR" dirty="0" smtClean="0">
+                <a:solidFill>
+                  <a:schemeClr val="tx1"/>
+                </a:solidFill>
+              </a:rPr>
+              <a:t>Getter</a:t>
             </a:r>
             <a:endParaRPr lang="ko-KR" altLang="en-US" dirty="0">
               <a:solidFill>

</xml_diff>

<commit_message>
Revert "Revert "Added some classes to C# server, and modified documents""
This reverts commit b292910821c7781c32245eb44b6265b688748a5b.
</commit_message>
<xml_diff>
--- a/문서/개요.pptx
+++ b/문서/개요.pptx
@@ -3954,7 +3954,18 @@
                   <a:schemeClr val="tx1"/>
                 </a:solidFill>
               </a:rPr>
-              <a:t>Win 32 API</a:t>
+              <a:t>Utilities</a:t>
+            </a:r>
+          </a:p>
+          <a:p>
+            <a:pPr algn="ctr"/>
+            <a:r>
+              <a:rPr lang="en-US" altLang="ko-KR" dirty="0" smtClean="0">
+                <a:solidFill>
+                  <a:schemeClr val="tx1"/>
+                </a:solidFill>
+              </a:rPr>
+              <a:t>(Include Win 32 API)</a:t>
             </a:r>
             <a:endParaRPr lang="ko-KR" altLang="en-US" dirty="0">
               <a:solidFill>
@@ -4961,15 +4972,7 @@
                   <a:schemeClr val="tx1"/>
                 </a:solidFill>
               </a:rPr>
-              <a:t>Page </a:t>
-            </a:r>
-            <a:r>
-              <a:rPr lang="en-US" altLang="ko-KR" dirty="0" smtClean="0">
-                <a:solidFill>
-                  <a:schemeClr val="tx1"/>
-                </a:solidFill>
-              </a:rPr>
-              <a:t>Setter</a:t>
+              <a:t>Page Setter</a:t>
             </a:r>
             <a:endParaRPr lang="ko-KR" altLang="en-US" dirty="0">
               <a:solidFill>
@@ -5029,15 +5032,7 @@
                   <a:schemeClr val="tx1"/>
                 </a:solidFill>
               </a:rPr>
-              <a:t>Screen </a:t>
-            </a:r>
-            <a:r>
-              <a:rPr lang="en-US" altLang="ko-KR" dirty="0" smtClean="0">
-                <a:solidFill>
-                  <a:schemeClr val="tx1"/>
-                </a:solidFill>
-              </a:rPr>
-              <a:t>Getter</a:t>
+              <a:t>Screen Getter</a:t>
             </a:r>
             <a:endParaRPr lang="ko-KR" altLang="en-US" dirty="0">
               <a:solidFill>
@@ -5810,7 +5805,7 @@
                   <a:schemeClr val="tx1"/>
                 </a:solidFill>
               </a:rPr>
-              <a:t>Win 32 API</a:t>
+              <a:t>Utilities</a:t>
             </a:r>
             <a:endParaRPr lang="ko-KR" altLang="en-US" dirty="0">
               <a:solidFill>
@@ -6053,15 +6048,7 @@
                   <a:schemeClr val="tx1"/>
                 </a:solidFill>
               </a:rPr>
-              <a:t>Page </a:t>
-            </a:r>
-            <a:r>
-              <a:rPr lang="en-US" altLang="ko-KR" dirty="0" smtClean="0">
-                <a:solidFill>
-                  <a:schemeClr val="tx1"/>
-                </a:solidFill>
-              </a:rPr>
-              <a:t>Setter</a:t>
+              <a:t>Page Setter</a:t>
             </a:r>
             <a:endParaRPr lang="ko-KR" altLang="en-US" dirty="0">
               <a:solidFill>
@@ -6121,15 +6108,7 @@
                   <a:schemeClr val="tx1"/>
                 </a:solidFill>
               </a:rPr>
-              <a:t>Screen </a:t>
-            </a:r>
-            <a:r>
-              <a:rPr lang="en-US" altLang="ko-KR" dirty="0" smtClean="0">
-                <a:solidFill>
-                  <a:schemeClr val="tx1"/>
-                </a:solidFill>
-              </a:rPr>
-              <a:t>Getter</a:t>
+              <a:t>Screen Getter</a:t>
             </a:r>
             <a:endParaRPr lang="ko-KR" altLang="en-US" dirty="0">
               <a:solidFill>

</xml_diff>

<commit_message>
Modified C# server side source code and documents
</commit_message>
<xml_diff>
--- a/문서/개요.pptx
+++ b/문서/개요.pptx
@@ -11,8 +11,8 @@
     <p:sldId id="256" r:id="rId2"/>
     <p:sldId id="259" r:id="rId3"/>
     <p:sldId id="257" r:id="rId4"/>
-    <p:sldId id="261" r:id="rId5"/>
-    <p:sldId id="260" r:id="rId6"/>
+    <p:sldId id="263" r:id="rId5"/>
+    <p:sldId id="264" r:id="rId6"/>
   </p:sldIdLst>
   <p:sldSz cx="9144000" cy="6858000" type="screen4x3"/>
   <p:notesSz cx="6858000" cy="9144000"/>
@@ -196,7 +196,7 @@
           <a:p>
             <a:fld id="{3C1C3DBF-00C9-4A35-AB43-60AC3FC39EEF}" type="datetimeFigureOut">
               <a:rPr lang="ko-KR" altLang="en-US" smtClean="0"/>
-              <a:t>2019-03-18</a:t>
+              <a:t>2019-03-19</a:t>
             </a:fld>
             <a:endParaRPr lang="ko-KR" altLang="en-US"/>
           </a:p>
@@ -613,7 +613,7 @@
           <a:p>
             <a:fld id="{A96F2401-FF15-4002-991A-92DF2B538DC7}" type="slidenum">
               <a:rPr lang="ko-KR" altLang="en-US" smtClean="0"/>
-              <a:t>4</a:t>
+              <a:t>5</a:t>
             </a:fld>
             <a:endParaRPr lang="ko-KR" altLang="en-US"/>
           </a:p>
@@ -622,7 +622,7 @@
     </p:spTree>
     <p:extLst>
       <p:ext uri="{BB962C8B-B14F-4D97-AF65-F5344CB8AC3E}">
-        <p14:creationId xmlns:p14="http://schemas.microsoft.com/office/powerpoint/2010/main" val="1145056404"/>
+        <p14:creationId xmlns:p14="http://schemas.microsoft.com/office/powerpoint/2010/main" val="3374799556"/>
       </p:ext>
     </p:extLst>
   </p:cSld>
@@ -813,7 +813,7 @@
           <a:p>
             <a:fld id="{FB5DFCFC-1AC0-4B05-9252-81274CA8985A}" type="datetimeFigureOut">
               <a:rPr lang="ko-KR" altLang="en-US" smtClean="0"/>
-              <a:t>2019-03-18</a:t>
+              <a:t>2019-03-19</a:t>
             </a:fld>
             <a:endParaRPr lang="ko-KR" altLang="en-US"/>
           </a:p>
@@ -983,7 +983,7 @@
           <a:p>
             <a:fld id="{FB5DFCFC-1AC0-4B05-9252-81274CA8985A}" type="datetimeFigureOut">
               <a:rPr lang="ko-KR" altLang="en-US" smtClean="0"/>
-              <a:t>2019-03-18</a:t>
+              <a:t>2019-03-19</a:t>
             </a:fld>
             <a:endParaRPr lang="ko-KR" altLang="en-US"/>
           </a:p>
@@ -1163,7 +1163,7 @@
           <a:p>
             <a:fld id="{FB5DFCFC-1AC0-4B05-9252-81274CA8985A}" type="datetimeFigureOut">
               <a:rPr lang="ko-KR" altLang="en-US" smtClean="0"/>
-              <a:t>2019-03-18</a:t>
+              <a:t>2019-03-19</a:t>
             </a:fld>
             <a:endParaRPr lang="ko-KR" altLang="en-US"/>
           </a:p>
@@ -1333,7 +1333,7 @@
           <a:p>
             <a:fld id="{FB5DFCFC-1AC0-4B05-9252-81274CA8985A}" type="datetimeFigureOut">
               <a:rPr lang="ko-KR" altLang="en-US" smtClean="0"/>
-              <a:t>2019-03-18</a:t>
+              <a:t>2019-03-19</a:t>
             </a:fld>
             <a:endParaRPr lang="ko-KR" altLang="en-US"/>
           </a:p>
@@ -1579,7 +1579,7 @@
           <a:p>
             <a:fld id="{FB5DFCFC-1AC0-4B05-9252-81274CA8985A}" type="datetimeFigureOut">
               <a:rPr lang="ko-KR" altLang="en-US" smtClean="0"/>
-              <a:t>2019-03-18</a:t>
+              <a:t>2019-03-19</a:t>
             </a:fld>
             <a:endParaRPr lang="ko-KR" altLang="en-US"/>
           </a:p>
@@ -1867,7 +1867,7 @@
           <a:p>
             <a:fld id="{FB5DFCFC-1AC0-4B05-9252-81274CA8985A}" type="datetimeFigureOut">
               <a:rPr lang="ko-KR" altLang="en-US" smtClean="0"/>
-              <a:t>2019-03-18</a:t>
+              <a:t>2019-03-19</a:t>
             </a:fld>
             <a:endParaRPr lang="ko-KR" altLang="en-US"/>
           </a:p>
@@ -2289,7 +2289,7 @@
           <a:p>
             <a:fld id="{FB5DFCFC-1AC0-4B05-9252-81274CA8985A}" type="datetimeFigureOut">
               <a:rPr lang="ko-KR" altLang="en-US" smtClean="0"/>
-              <a:t>2019-03-18</a:t>
+              <a:t>2019-03-19</a:t>
             </a:fld>
             <a:endParaRPr lang="ko-KR" altLang="en-US"/>
           </a:p>
@@ -2407,7 +2407,7 @@
           <a:p>
             <a:fld id="{FB5DFCFC-1AC0-4B05-9252-81274CA8985A}" type="datetimeFigureOut">
               <a:rPr lang="ko-KR" altLang="en-US" smtClean="0"/>
-              <a:t>2019-03-18</a:t>
+              <a:t>2019-03-19</a:t>
             </a:fld>
             <a:endParaRPr lang="ko-KR" altLang="en-US"/>
           </a:p>
@@ -2502,7 +2502,7 @@
           <a:p>
             <a:fld id="{FB5DFCFC-1AC0-4B05-9252-81274CA8985A}" type="datetimeFigureOut">
               <a:rPr lang="ko-KR" altLang="en-US" smtClean="0"/>
-              <a:t>2019-03-18</a:t>
+              <a:t>2019-03-19</a:t>
             </a:fld>
             <a:endParaRPr lang="ko-KR" altLang="en-US"/>
           </a:p>
@@ -2779,7 +2779,7 @@
           <a:p>
             <a:fld id="{FB5DFCFC-1AC0-4B05-9252-81274CA8985A}" type="datetimeFigureOut">
               <a:rPr lang="ko-KR" altLang="en-US" smtClean="0"/>
-              <a:t>2019-03-18</a:t>
+              <a:t>2019-03-19</a:t>
             </a:fld>
             <a:endParaRPr lang="ko-KR" altLang="en-US"/>
           </a:p>
@@ -3032,7 +3032,7 @@
           <a:p>
             <a:fld id="{FB5DFCFC-1AC0-4B05-9252-81274CA8985A}" type="datetimeFigureOut">
               <a:rPr lang="ko-KR" altLang="en-US" smtClean="0"/>
-              <a:t>2019-03-18</a:t>
+              <a:t>2019-03-19</a:t>
             </a:fld>
             <a:endParaRPr lang="ko-KR" altLang="en-US"/>
           </a:p>
@@ -3245,7 +3245,7 @@
           <a:p>
             <a:fld id="{FB5DFCFC-1AC0-4B05-9252-81274CA8985A}" type="datetimeFigureOut">
               <a:rPr lang="ko-KR" altLang="en-US" smtClean="0"/>
-              <a:t>2019-03-18</a:t>
+              <a:t>2019-03-19</a:t>
             </a:fld>
             <a:endParaRPr lang="ko-KR" altLang="en-US"/>
           </a:p>
@@ -4222,11 +4222,63 @@
         </p:nvSpPr>
         <p:spPr/>
         <p:txBody>
-          <a:bodyPr/>
-          <a:lstStyle/>
-          <a:p>
-            <a:r>
-              <a:rPr lang="ko-KR" altLang="en-US" dirty="0" smtClean="0">
+          <a:bodyPr>
+            <a:normAutofit/>
+          </a:bodyPr>
+          <a:lstStyle/>
+          <a:p>
+            <a:r>
+              <a:rPr lang="ko-KR" altLang="en-US" dirty="0"/>
+              <a:t>커맨드 패턴</a:t>
+            </a:r>
+            <a:endParaRPr lang="en-US" altLang="ko-KR" dirty="0"/>
+          </a:p>
+          <a:p>
+            <a:pPr lvl="1"/>
+            <a:r>
+              <a:rPr lang="ko-KR" altLang="en-US" dirty="0" err="1">
+                <a:solidFill>
+                  <a:srgbClr val="FF0000"/>
+                </a:solidFill>
+              </a:rPr>
+              <a:t>인보커</a:t>
+            </a:r>
+            <a:r>
+              <a:rPr lang="ko-KR" altLang="en-US" dirty="0"/>
+              <a:t> </a:t>
+            </a:r>
+            <a:r>
+              <a:rPr lang="en-US" altLang="ko-KR" dirty="0"/>
+              <a:t>: UI</a:t>
+            </a:r>
+          </a:p>
+          <a:p>
+            <a:pPr lvl="1"/>
+            <a:r>
+              <a:rPr lang="ko-KR" altLang="en-US" dirty="0">
+                <a:solidFill>
+                  <a:srgbClr val="0000FF"/>
+                </a:solidFill>
+              </a:rPr>
+              <a:t>리시버</a:t>
+            </a:r>
+            <a:r>
+              <a:rPr lang="ko-KR" altLang="en-US" dirty="0"/>
+              <a:t> </a:t>
+            </a:r>
+            <a:r>
+              <a:rPr lang="en-US" altLang="ko-KR" dirty="0"/>
+              <a:t>: </a:t>
+            </a:r>
+            <a:r>
+              <a:rPr lang="ko-KR" altLang="en-US" dirty="0"/>
+              <a:t>통신 모듈</a:t>
+            </a:r>
+          </a:p>
+          <a:p>
+            <a:pPr lvl="1"/>
+            <a:r>
+              <a:rPr lang="ko-KR" altLang="en-US" dirty="0">
                 <a:solidFill>
                   <a:srgbClr val="00FF00"/>
                 </a:solidFill>
@@ -4234,38 +4286,46 @@
               <a:t>커맨드</a:t>
             </a:r>
             <a:r>
+              <a:rPr lang="ko-KR" altLang="en-US" dirty="0"/>
+              <a:t> </a:t>
+            </a:r>
+            <a:r>
+              <a:rPr lang="en-US" altLang="ko-KR" dirty="0"/>
+              <a:t>: </a:t>
+            </a:r>
+            <a:r>
+              <a:rPr lang="ko-KR" altLang="en-US" dirty="0"/>
+              <a:t>페이지 변경</a:t>
+            </a:r>
+            <a:endParaRPr lang="en-US" altLang="ko-KR" dirty="0"/>
+          </a:p>
+          <a:p>
+            <a:endParaRPr lang="en-US" altLang="ko-KR" dirty="0"/>
+          </a:p>
+          <a:p>
+            <a:r>
+              <a:rPr lang="ko-KR" altLang="en-US" dirty="0" err="1" smtClean="0"/>
+              <a:t>옵저버</a:t>
+            </a:r>
+            <a:r>
               <a:rPr lang="ko-KR" altLang="en-US" dirty="0" smtClean="0"/>
-              <a:t> 패턴</a:t>
+              <a:t> </a:t>
+            </a:r>
+            <a:r>
+              <a:rPr lang="ko-KR" altLang="en-US" dirty="0" smtClean="0"/>
+              <a:t>패턴</a:t>
             </a:r>
             <a:endParaRPr lang="en-US" altLang="ko-KR" dirty="0" smtClean="0"/>
           </a:p>
           <a:p>
             <a:pPr lvl="1"/>
-            <a:r>
-              <a:rPr lang="ko-KR" altLang="en-US" dirty="0" smtClean="0"/>
-              <a:t>스크린 가져오는 커맨드</a:t>
-            </a:r>
-            <a:endParaRPr lang="en-US" altLang="ko-KR" dirty="0" smtClean="0"/>
-          </a:p>
-          <a:p>
-            <a:pPr lvl="1"/>
-            <a:r>
-              <a:rPr lang="ko-KR" altLang="en-US" dirty="0" smtClean="0"/>
-              <a:t>페이지 바꾸는 커맨드</a:t>
-            </a:r>
-            <a:endParaRPr lang="en-US" altLang="ko-KR" dirty="0" smtClean="0"/>
-          </a:p>
-          <a:p>
-            <a:endParaRPr lang="en-US" altLang="ko-KR" dirty="0"/>
-          </a:p>
-          <a:p>
             <a:r>
               <a:rPr lang="ko-KR" altLang="en-US" dirty="0" err="1" smtClean="0">
                 <a:solidFill>
-                  <a:srgbClr val="FF0000"/>
+                  <a:srgbClr val="FFC000"/>
                 </a:solidFill>
               </a:rPr>
-              <a:t>인보커</a:t>
+              <a:t>옵저버</a:t>
             </a:r>
             <a:r>
               <a:rPr lang="ko-KR" altLang="en-US" dirty="0" smtClean="0"/>
@@ -4277,16 +4337,14 @@
             </a:r>
           </a:p>
           <a:p>
-            <a:endParaRPr lang="en-US" altLang="ko-KR" dirty="0"/>
-          </a:p>
-          <a:p>
-            <a:r>
-              <a:rPr lang="ko-KR" altLang="en-US" dirty="0" smtClean="0">
+            <a:pPr lvl="1"/>
+            <a:r>
+              <a:rPr lang="ko-KR" altLang="en-US" dirty="0" err="1" smtClean="0">
                 <a:solidFill>
-                  <a:srgbClr val="0000FF"/>
+                  <a:srgbClr val="00B0F0"/>
                 </a:solidFill>
               </a:rPr>
-              <a:t>리시버</a:t>
+              <a:t>서브젝트</a:t>
             </a:r>
             <a:r>
               <a:rPr lang="ko-KR" altLang="en-US" dirty="0" smtClean="0"/>
@@ -4300,7 +4358,7 @@
               <a:rPr lang="ko-KR" altLang="en-US" dirty="0" smtClean="0"/>
               <a:t>통신 모듈</a:t>
             </a:r>
-            <a:endParaRPr lang="ko-KR" altLang="en-US" dirty="0"/>
+            <a:endParaRPr lang="en-US" altLang="ko-KR" dirty="0"/>
           </a:p>
         </p:txBody>
       </p:sp>
@@ -4638,7 +4696,7 @@
           </a:solidFill>
           <a:ln>
             <a:solidFill>
-              <a:srgbClr val="FF0000"/>
+              <a:srgbClr val="FFC000"/>
             </a:solidFill>
           </a:ln>
         </p:spPr>
@@ -4669,7 +4727,26 @@
                   <a:schemeClr val="tx1"/>
                 </a:solidFill>
               </a:rPr>
-              <a:t>Screen Viewer</a:t>
+              <a:t>Screen </a:t>
+            </a:r>
+            <a:r>
+              <a:rPr lang="en-US" altLang="ko-KR" dirty="0" smtClean="0">
+                <a:solidFill>
+                  <a:schemeClr val="tx1"/>
+                </a:solidFill>
+              </a:rPr>
+              <a:t>Viewer</a:t>
+            </a:r>
+          </a:p>
+          <a:p>
+            <a:pPr algn="ctr"/>
+            <a:r>
+              <a:rPr lang="en-US" altLang="ko-KR" dirty="0" smtClean="0">
+                <a:solidFill>
+                  <a:schemeClr val="tx1"/>
+                </a:solidFill>
+              </a:rPr>
+              <a:t>(Observer)</a:t>
             </a:r>
             <a:endParaRPr lang="ko-KR" altLang="en-US" dirty="0">
               <a:solidFill>
@@ -4747,8 +4824,8 @@
         </p:nvSpPr>
         <p:spPr>
           <a:xfrm>
-            <a:off x="3311860" y="1219672"/>
-            <a:ext cx="2376264" cy="4513583"/>
+            <a:off x="3311860" y="3573015"/>
+            <a:ext cx="2376264" cy="2160239"/>
           </a:xfrm>
           <a:prstGeom prst="rect">
             <a:avLst/>
@@ -4821,7 +4898,7 @@
           </a:solidFill>
           <a:ln>
             <a:solidFill>
-              <a:srgbClr val="0000FF"/>
+              <a:srgbClr val="00B0F0"/>
             </a:solidFill>
           </a:ln>
         </p:spPr>
@@ -4852,7 +4929,26 @@
                   <a:schemeClr val="tx1"/>
                 </a:solidFill>
               </a:rPr>
-              <a:t>Screen Getter</a:t>
+              <a:t>Screen </a:t>
+            </a:r>
+            <a:r>
+              <a:rPr lang="en-US" altLang="ko-KR" dirty="0" smtClean="0">
+                <a:solidFill>
+                  <a:schemeClr val="tx1"/>
+                </a:solidFill>
+              </a:rPr>
+              <a:t>Renewal</a:t>
+            </a:r>
+          </a:p>
+          <a:p>
+            <a:pPr algn="ctr"/>
+            <a:r>
+              <a:rPr lang="en-US" altLang="ko-KR" dirty="0" smtClean="0">
+                <a:solidFill>
+                  <a:schemeClr val="tx1"/>
+                </a:solidFill>
+              </a:rPr>
+              <a:t>(Subject)</a:t>
             </a:r>
             <a:endParaRPr lang="ko-KR" altLang="en-US" dirty="0">
               <a:solidFill>
@@ -4982,146 +5078,6 @@
           </a:p>
         </p:txBody>
       </p:sp>
-      <p:sp>
-        <p:nvSpPr>
-          <p:cNvPr id="58" name="직사각형 57"/>
-          <p:cNvSpPr/>
-          <p:nvPr/>
-        </p:nvSpPr>
-        <p:spPr>
-          <a:xfrm>
-            <a:off x="3631446" y="1669165"/>
-            <a:ext cx="1737092" cy="1232858"/>
-          </a:xfrm>
-          <a:prstGeom prst="rect">
-            <a:avLst/>
-          </a:prstGeom>
-          <a:solidFill>
-            <a:schemeClr val="bg1"/>
-          </a:solidFill>
-          <a:ln>
-            <a:solidFill>
-              <a:srgbClr val="00FF00"/>
-            </a:solidFill>
-          </a:ln>
-        </p:spPr>
-        <p:style>
-          <a:lnRef idx="2">
-            <a:schemeClr val="accent1">
-              <a:shade val="50000"/>
-            </a:schemeClr>
-          </a:lnRef>
-          <a:fillRef idx="1">
-            <a:schemeClr val="accent1"/>
-          </a:fillRef>
-          <a:effectRef idx="0">
-            <a:schemeClr val="accent1"/>
-          </a:effectRef>
-          <a:fontRef idx="minor">
-            <a:schemeClr val="lt1"/>
-          </a:fontRef>
-        </p:style>
-        <p:txBody>
-          <a:bodyPr rtlCol="0" anchor="ctr" anchorCtr="0"/>
-          <a:lstStyle/>
-          <a:p>
-            <a:pPr algn="ctr"/>
-            <a:r>
-              <a:rPr lang="en-US" altLang="ko-KR" dirty="0" smtClean="0">
-                <a:solidFill>
-                  <a:schemeClr val="tx1"/>
-                </a:solidFill>
-              </a:rPr>
-              <a:t>Screen Getter</a:t>
-            </a:r>
-            <a:endParaRPr lang="ko-KR" altLang="en-US" dirty="0">
-              <a:solidFill>
-                <a:schemeClr val="tx1"/>
-              </a:solidFill>
-            </a:endParaRPr>
-          </a:p>
-        </p:txBody>
-      </p:sp>
-      <p:cxnSp>
-        <p:nvCxnSpPr>
-          <p:cNvPr id="59" name="직선 화살표 연결선 58"/>
-          <p:cNvCxnSpPr>
-            <a:stCxn id="58" idx="1"/>
-            <a:endCxn id="49" idx="3"/>
-          </p:cNvCxnSpPr>
-          <p:nvPr/>
-        </p:nvCxnSpPr>
-        <p:spPr>
-          <a:xfrm flipH="1">
-            <a:off x="2956270" y="2285594"/>
-            <a:ext cx="675176" cy="0"/>
-          </a:xfrm>
-          <a:prstGeom prst="straightConnector1">
-            <a:avLst/>
-          </a:prstGeom>
-          <a:ln w="25400">
-            <a:solidFill>
-              <a:schemeClr val="tx1"/>
-            </a:solidFill>
-            <a:headEnd type="arrow" w="lg" len="lg"/>
-            <a:tailEnd type="arrow" w="lg" len="lg"/>
-          </a:ln>
-        </p:spPr>
-        <p:style>
-          <a:lnRef idx="1">
-            <a:schemeClr val="accent1"/>
-          </a:lnRef>
-          <a:fillRef idx="0">
-            <a:schemeClr val="accent1"/>
-          </a:fillRef>
-          <a:effectRef idx="0">
-            <a:schemeClr val="accent1"/>
-          </a:effectRef>
-          <a:fontRef idx="minor">
-            <a:schemeClr val="tx1"/>
-          </a:fontRef>
-        </p:style>
-      </p:cxnSp>
-      <p:cxnSp>
-        <p:nvCxnSpPr>
-          <p:cNvPr id="64" name="직선 화살표 연결선 63"/>
-          <p:cNvCxnSpPr>
-            <a:stCxn id="55" idx="1"/>
-            <a:endCxn id="58" idx="3"/>
-          </p:cNvCxnSpPr>
-          <p:nvPr/>
-        </p:nvCxnSpPr>
-        <p:spPr>
-          <a:xfrm flipH="1">
-            <a:off x="5368538" y="2285594"/>
-            <a:ext cx="675176" cy="0"/>
-          </a:xfrm>
-          <a:prstGeom prst="straightConnector1">
-            <a:avLst/>
-          </a:prstGeom>
-          <a:ln w="25400">
-            <a:solidFill>
-              <a:schemeClr val="tx1"/>
-            </a:solidFill>
-            <a:headEnd type="arrow" w="lg" len="lg"/>
-            <a:tailEnd type="arrow" w="lg" len="lg"/>
-          </a:ln>
-        </p:spPr>
-        <p:style>
-          <a:lnRef idx="1">
-            <a:schemeClr val="accent1"/>
-          </a:lnRef>
-          <a:fillRef idx="0">
-            <a:schemeClr val="accent1"/>
-          </a:fillRef>
-          <a:effectRef idx="0">
-            <a:schemeClr val="accent1"/>
-          </a:effectRef>
-          <a:fontRef idx="minor">
-            <a:schemeClr val="tx1"/>
-          </a:fontRef>
-        </p:style>
-      </p:cxnSp>
       <p:cxnSp>
         <p:nvCxnSpPr>
           <p:cNvPr id="69" name="직선 화살표 연결선 68"/>
@@ -5213,6 +5169,46 @@
           <a:xfrm flipV="1">
             <a:off x="2956270" y="5099382"/>
             <a:ext cx="675176" cy="1"/>
+          </a:xfrm>
+          <a:prstGeom prst="straightConnector1">
+            <a:avLst/>
+          </a:prstGeom>
+          <a:ln w="25400">
+            <a:solidFill>
+              <a:schemeClr val="tx1"/>
+            </a:solidFill>
+            <a:headEnd type="none" w="lg" len="lg"/>
+            <a:tailEnd type="arrow" w="lg" len="lg"/>
+          </a:ln>
+        </p:spPr>
+        <p:style>
+          <a:lnRef idx="1">
+            <a:schemeClr val="accent1"/>
+          </a:lnRef>
+          <a:fillRef idx="0">
+            <a:schemeClr val="accent1"/>
+          </a:fillRef>
+          <a:effectRef idx="0">
+            <a:schemeClr val="accent1"/>
+          </a:effectRef>
+          <a:fontRef idx="minor">
+            <a:schemeClr val="tx1"/>
+          </a:fontRef>
+        </p:style>
+      </p:cxnSp>
+      <p:cxnSp>
+        <p:nvCxnSpPr>
+          <p:cNvPr id="22" name="직선 화살표 연결선 21"/>
+          <p:cNvCxnSpPr>
+            <a:stCxn id="55" idx="1"/>
+            <a:endCxn id="49" idx="3"/>
+          </p:cNvCxnSpPr>
+          <p:nvPr/>
+        </p:nvCxnSpPr>
+        <p:spPr>
+          <a:xfrm flipH="1">
+            <a:off x="2956270" y="2285594"/>
+            <a:ext cx="3087444" cy="0"/>
           </a:xfrm>
           <a:prstGeom prst="straightConnector1">
             <a:avLst/>
@@ -5305,50 +5301,58 @@
         </p:nvSpPr>
         <p:spPr/>
         <p:txBody>
-          <a:bodyPr/>
-          <a:lstStyle/>
-          <a:p>
-            <a:r>
-              <a:rPr lang="ko-KR" altLang="en-US" dirty="0" smtClean="0">
+          <a:bodyPr>
+            <a:normAutofit/>
+          </a:bodyPr>
+          <a:lstStyle/>
+          <a:p>
+            <a:r>
+              <a:rPr lang="ko-KR" altLang="en-US" dirty="0" err="1" smtClean="0"/>
+              <a:t>옵저버</a:t>
+            </a:r>
+            <a:r>
+              <a:rPr lang="ko-KR" altLang="en-US" dirty="0" smtClean="0"/>
+              <a:t> </a:t>
+            </a:r>
+            <a:r>
+              <a:rPr lang="ko-KR" altLang="en-US" dirty="0" smtClean="0"/>
+              <a:t>패턴</a:t>
+            </a:r>
+            <a:endParaRPr lang="en-US" altLang="ko-KR" dirty="0" smtClean="0"/>
+          </a:p>
+          <a:p>
+            <a:pPr lvl="1"/>
+            <a:r>
+              <a:rPr lang="ko-KR" altLang="en-US" dirty="0" err="1" smtClean="0">
                 <a:solidFill>
-                  <a:srgbClr val="00FF00"/>
+                  <a:srgbClr val="FFC000"/>
                 </a:solidFill>
               </a:rPr>
-              <a:t>커맨드</a:t>
+              <a:t>옵저버</a:t>
             </a:r>
             <a:r>
               <a:rPr lang="ko-KR" altLang="en-US" dirty="0" smtClean="0"/>
-              <a:t> 패턴</a:t>
+              <a:t> </a:t>
+            </a:r>
+            <a:r>
+              <a:rPr lang="en-US" altLang="ko-KR" dirty="0" smtClean="0"/>
+              <a:t>: </a:t>
+            </a:r>
+            <a:r>
+              <a:rPr lang="ko-KR" altLang="en-US" dirty="0" smtClean="0"/>
+              <a:t>통신 모듈</a:t>
             </a:r>
             <a:endParaRPr lang="en-US" altLang="ko-KR" dirty="0" smtClean="0"/>
           </a:p>
           <a:p>
             <a:pPr lvl="1"/>
-            <a:r>
-              <a:rPr lang="ko-KR" altLang="en-US" dirty="0" smtClean="0"/>
-              <a:t>스크린 가져오는 커맨드</a:t>
-            </a:r>
-            <a:endParaRPr lang="en-US" altLang="ko-KR" dirty="0" smtClean="0"/>
-          </a:p>
-          <a:p>
-            <a:pPr lvl="1"/>
-            <a:r>
-              <a:rPr lang="ko-KR" altLang="en-US" dirty="0" smtClean="0"/>
-              <a:t>페이지 바꾸는 커맨드</a:t>
-            </a:r>
-            <a:endParaRPr lang="en-US" altLang="ko-KR" dirty="0" smtClean="0"/>
-          </a:p>
-          <a:p>
-            <a:endParaRPr lang="en-US" altLang="ko-KR" dirty="0"/>
-          </a:p>
-          <a:p>
             <a:r>
               <a:rPr lang="ko-KR" altLang="en-US" dirty="0" err="1" smtClean="0">
                 <a:solidFill>
-                  <a:srgbClr val="FF0000"/>
+                  <a:srgbClr val="00B0F0"/>
                 </a:solidFill>
               </a:rPr>
-              <a:t>인보커</a:t>
+              <a:t>서브젝트</a:t>
             </a:r>
             <a:r>
               <a:rPr lang="ko-KR" altLang="en-US" dirty="0" smtClean="0"/>
@@ -5356,61 +5360,16 @@
             </a:r>
             <a:r>
               <a:rPr lang="en-US" altLang="ko-KR" dirty="0" smtClean="0"/>
-              <a:t>: </a:t>
-            </a:r>
-            <a:r>
-              <a:rPr lang="ko-KR" altLang="en-US" dirty="0" smtClean="0"/>
-              <a:t>통신 모듈</a:t>
-            </a:r>
-            <a:endParaRPr lang="en-US" altLang="ko-KR" dirty="0" smtClean="0"/>
-          </a:p>
-          <a:p>
+              <a:t>: Screen</a:t>
+            </a:r>
             <a:endParaRPr lang="en-US" altLang="ko-KR" dirty="0"/>
-          </a:p>
-          <a:p>
-            <a:r>
-              <a:rPr lang="ko-KR" altLang="en-US" dirty="0" smtClean="0">
-                <a:solidFill>
-                  <a:srgbClr val="0000FF"/>
-                </a:solidFill>
-              </a:rPr>
-              <a:t>리시버</a:t>
-            </a:r>
-            <a:r>
-              <a:rPr lang="ko-KR" altLang="en-US" dirty="0" smtClean="0"/>
-              <a:t> </a:t>
-            </a:r>
-            <a:r>
-              <a:rPr lang="en-US" altLang="ko-KR" dirty="0" smtClean="0"/>
-              <a:t>: Win 32 API</a:t>
-            </a:r>
-          </a:p>
-          <a:p>
-            <a:pPr lvl="1"/>
-            <a:r>
-              <a:rPr lang="ko-KR" altLang="en-US" dirty="0" smtClean="0"/>
-              <a:t>객체가 아닌 </a:t>
-            </a:r>
-            <a:r>
-              <a:rPr lang="en-US" altLang="ko-KR" dirty="0" smtClean="0"/>
-              <a:t>Static </a:t>
-            </a:r>
-            <a:r>
-              <a:rPr lang="ko-KR" altLang="en-US" dirty="0" err="1" smtClean="0"/>
-              <a:t>메소드를</a:t>
-            </a:r>
-            <a:r>
-              <a:rPr lang="ko-KR" altLang="en-US" dirty="0" smtClean="0"/>
-              <a:t> 호출</a:t>
-            </a:r>
-            <a:endParaRPr lang="ko-KR" altLang="en-US" dirty="0"/>
           </a:p>
         </p:txBody>
       </p:sp>
     </p:spTree>
     <p:extLst>
       <p:ext uri="{BB962C8B-B14F-4D97-AF65-F5344CB8AC3E}">
-        <p14:creationId xmlns:p14="http://schemas.microsoft.com/office/powerpoint/2010/main" val="1631896820"/>
+        <p14:creationId xmlns:p14="http://schemas.microsoft.com/office/powerpoint/2010/main" val="2013891769"/>
       </p:ext>
     </p:extLst>
   </p:cSld>
@@ -5439,7 +5398,7 @@
       </p:grpSpPr>
       <p:sp>
         <p:nvSpPr>
-          <p:cNvPr id="21" name="직사각형 20"/>
+          <p:cNvPr id="4" name="직사각형 3"/>
           <p:cNvSpPr/>
           <p:nvPr/>
         </p:nvSpPr>
@@ -5491,7 +5450,7 @@
       </p:sp>
       <p:sp>
         <p:nvSpPr>
-          <p:cNvPr id="22" name="직사각형 21"/>
+          <p:cNvPr id="7" name="직사각형 6"/>
           <p:cNvSpPr/>
           <p:nvPr/>
         </p:nvSpPr>
@@ -5551,7 +5510,7 @@
       </p:sp>
       <p:sp>
         <p:nvSpPr>
-          <p:cNvPr id="23" name="TextBox 22"/>
+          <p:cNvPr id="16" name="TextBox 15"/>
           <p:cNvSpPr txBox="1"/>
           <p:nvPr/>
         </p:nvSpPr>
@@ -5582,7 +5541,7 @@
       </p:sp>
       <p:sp>
         <p:nvSpPr>
-          <p:cNvPr id="24" name="직사각형 23"/>
+          <p:cNvPr id="18" name="직사각형 17"/>
           <p:cNvSpPr/>
           <p:nvPr/>
         </p:nvSpPr>
@@ -5642,7 +5601,7 @@
       </p:sp>
       <p:sp>
         <p:nvSpPr>
-          <p:cNvPr id="25" name="직사각형 24"/>
+          <p:cNvPr id="19" name="직사각형 18"/>
           <p:cNvSpPr/>
           <p:nvPr/>
         </p:nvSpPr>
@@ -5692,12 +5651,17 @@
               </a:rPr>
               <a:t>Next Page</a:t>
             </a:r>
-          </a:p>
-        </p:txBody>
-      </p:sp>
-      <p:sp>
-        <p:nvSpPr>
-          <p:cNvPr id="26" name="직사각형 25"/>
+            <a:endParaRPr lang="ko-KR" altLang="en-US" dirty="0">
+              <a:solidFill>
+                <a:schemeClr val="tx1"/>
+              </a:solidFill>
+            </a:endParaRPr>
+          </a:p>
+        </p:txBody>
+      </p:sp>
+      <p:sp>
+        <p:nvSpPr>
+          <p:cNvPr id="49" name="직사각형 48"/>
           <p:cNvSpPr/>
           <p:nvPr/>
         </p:nvSpPr>
@@ -5714,7 +5678,7 @@
           </a:solidFill>
           <a:ln>
             <a:solidFill>
-              <a:srgbClr val="FF0000"/>
+              <a:srgbClr val="FFC000"/>
             </a:solidFill>
           </a:ln>
         </p:spPr>
@@ -5745,7 +5709,26 @@
                   <a:schemeClr val="tx1"/>
                 </a:solidFill>
               </a:rPr>
-              <a:t>Screen Getter</a:t>
+              <a:t>Screen </a:t>
+            </a:r>
+            <a:r>
+              <a:rPr lang="en-US" altLang="ko-KR" dirty="0" smtClean="0">
+                <a:solidFill>
+                  <a:schemeClr val="tx1"/>
+                </a:solidFill>
+              </a:rPr>
+              <a:t>Renewal</a:t>
+            </a:r>
+          </a:p>
+          <a:p>
+            <a:pPr algn="ctr"/>
+            <a:r>
+              <a:rPr lang="en-US" altLang="ko-KR" dirty="0" smtClean="0">
+                <a:solidFill>
+                  <a:schemeClr val="tx1"/>
+                </a:solidFill>
+              </a:rPr>
+              <a:t>(Observer)</a:t>
             </a:r>
             <a:endParaRPr lang="ko-KR" altLang="en-US" dirty="0">
               <a:solidFill>
@@ -5757,7 +5740,7 @@
       </p:sp>
       <p:sp>
         <p:nvSpPr>
-          <p:cNvPr id="27" name="직사각형 26"/>
+          <p:cNvPr id="52" name="직사각형 51"/>
           <p:cNvSpPr/>
           <p:nvPr/>
         </p:nvSpPr>
@@ -5817,70 +5800,7 @@
       </p:sp>
       <p:sp>
         <p:nvSpPr>
-          <p:cNvPr id="28" name="직사각형 27"/>
-          <p:cNvSpPr/>
-          <p:nvPr/>
-        </p:nvSpPr>
-        <p:spPr>
-          <a:xfrm>
-            <a:off x="3311860" y="1219672"/>
-            <a:ext cx="2376264" cy="4513583"/>
-          </a:xfrm>
-          <a:prstGeom prst="rect">
-            <a:avLst/>
-          </a:prstGeom>
-          <a:solidFill>
-            <a:schemeClr val="bg1"/>
-          </a:solidFill>
-          <a:ln>
-            <a:solidFill>
-              <a:schemeClr val="tx1"/>
-            </a:solidFill>
-          </a:ln>
-        </p:spPr>
-        <p:style>
-          <a:lnRef idx="2">
-            <a:schemeClr val="accent1">
-              <a:shade val="50000"/>
-            </a:schemeClr>
-          </a:lnRef>
-          <a:fillRef idx="1">
-            <a:schemeClr val="accent1"/>
-          </a:fillRef>
-          <a:effectRef idx="0">
-            <a:schemeClr val="accent1"/>
-          </a:effectRef>
-          <a:fontRef idx="minor">
-            <a:schemeClr val="lt1"/>
-          </a:fontRef>
-        </p:style>
-        <p:txBody>
-          <a:bodyPr rtlCol="0" anchor="t" anchorCtr="0"/>
-          <a:lstStyle/>
-          <a:p>
-            <a:pPr algn="ctr"/>
-            <a:r>
-              <a:rPr lang="ko-KR" altLang="en-US" dirty="0" smtClean="0">
-                <a:solidFill>
-                  <a:schemeClr val="tx1"/>
-                </a:solidFill>
-              </a:rPr>
-              <a:t>커맨</a:t>
-            </a:r>
-            <a:r>
-              <a:rPr lang="ko-KR" altLang="en-US" dirty="0">
-                <a:solidFill>
-                  <a:schemeClr val="tx1"/>
-                </a:solidFill>
-              </a:rPr>
-              <a:t>드</a:t>
-            </a:r>
-          </a:p>
-        </p:txBody>
-      </p:sp>
-      <p:sp>
-        <p:nvSpPr>
-          <p:cNvPr id="29" name="직사각형 28"/>
+          <p:cNvPr id="55" name="직사각형 54"/>
           <p:cNvSpPr/>
           <p:nvPr/>
         </p:nvSpPr>
@@ -5897,7 +5817,7 @@
           </a:solidFill>
           <a:ln>
             <a:solidFill>
-              <a:srgbClr val="0000FF"/>
+              <a:srgbClr val="00B0F0"/>
             </a:solidFill>
           </a:ln>
         </p:spPr>
@@ -5928,7 +5848,18 @@
                   <a:schemeClr val="tx1"/>
                 </a:solidFill>
               </a:rPr>
-              <a:t>Screenshot</a:t>
+              <a:t>Screen</a:t>
+            </a:r>
+          </a:p>
+          <a:p>
+            <a:pPr algn="ctr"/>
+            <a:r>
+              <a:rPr lang="en-US" altLang="ko-KR" dirty="0" smtClean="0">
+                <a:solidFill>
+                  <a:schemeClr val="tx1"/>
+                </a:solidFill>
+              </a:rPr>
+              <a:t>(Subject)</a:t>
             </a:r>
             <a:endParaRPr lang="ko-KR" altLang="en-US" dirty="0">
               <a:solidFill>
@@ -5940,7 +5871,7 @@
       </p:sp>
       <p:sp>
         <p:nvSpPr>
-          <p:cNvPr id="30" name="직사각형 29"/>
+          <p:cNvPr id="56" name="직사각형 55"/>
           <p:cNvSpPr/>
           <p:nvPr/>
         </p:nvSpPr>
@@ -5998,219 +5929,18 @@
           </a:p>
         </p:txBody>
       </p:sp>
-      <p:sp>
-        <p:nvSpPr>
-          <p:cNvPr id="31" name="직사각형 30"/>
-          <p:cNvSpPr/>
-          <p:nvPr/>
-        </p:nvSpPr>
-        <p:spPr>
-          <a:xfrm>
-            <a:off x="3631446" y="4005064"/>
-            <a:ext cx="1737092" cy="1232858"/>
-          </a:xfrm>
-          <a:prstGeom prst="rect">
-            <a:avLst/>
-          </a:prstGeom>
-          <a:solidFill>
-            <a:schemeClr val="bg1"/>
-          </a:solidFill>
-          <a:ln>
-            <a:solidFill>
-              <a:srgbClr val="00FF00"/>
-            </a:solidFill>
-          </a:ln>
-        </p:spPr>
-        <p:style>
-          <a:lnRef idx="2">
-            <a:schemeClr val="accent1">
-              <a:shade val="50000"/>
-            </a:schemeClr>
-          </a:lnRef>
-          <a:fillRef idx="1">
-            <a:schemeClr val="accent1"/>
-          </a:fillRef>
-          <a:effectRef idx="0">
-            <a:schemeClr val="accent1"/>
-          </a:effectRef>
-          <a:fontRef idx="minor">
-            <a:schemeClr val="lt1"/>
-          </a:fontRef>
-        </p:style>
-        <p:txBody>
-          <a:bodyPr rtlCol="0" anchor="ctr" anchorCtr="0"/>
-          <a:lstStyle/>
-          <a:p>
-            <a:pPr algn="ctr"/>
-            <a:r>
-              <a:rPr lang="en-US" altLang="ko-KR" dirty="0" smtClean="0">
-                <a:solidFill>
-                  <a:schemeClr val="tx1"/>
-                </a:solidFill>
-              </a:rPr>
-              <a:t>Page Setter</a:t>
-            </a:r>
-            <a:endParaRPr lang="ko-KR" altLang="en-US" dirty="0">
-              <a:solidFill>
-                <a:schemeClr val="tx1"/>
-              </a:solidFill>
-            </a:endParaRPr>
-          </a:p>
-        </p:txBody>
-      </p:sp>
-      <p:sp>
-        <p:nvSpPr>
-          <p:cNvPr id="32" name="직사각형 31"/>
-          <p:cNvSpPr/>
-          <p:nvPr/>
-        </p:nvSpPr>
-        <p:spPr>
-          <a:xfrm>
-            <a:off x="3631446" y="1669165"/>
-            <a:ext cx="1737092" cy="1232858"/>
-          </a:xfrm>
-          <a:prstGeom prst="rect">
-            <a:avLst/>
-          </a:prstGeom>
-          <a:solidFill>
-            <a:schemeClr val="bg1"/>
-          </a:solidFill>
-          <a:ln>
-            <a:solidFill>
-              <a:srgbClr val="00FF00"/>
-            </a:solidFill>
-          </a:ln>
-        </p:spPr>
-        <p:style>
-          <a:lnRef idx="2">
-            <a:schemeClr val="accent1">
-              <a:shade val="50000"/>
-            </a:schemeClr>
-          </a:lnRef>
-          <a:fillRef idx="1">
-            <a:schemeClr val="accent1"/>
-          </a:fillRef>
-          <a:effectRef idx="0">
-            <a:schemeClr val="accent1"/>
-          </a:effectRef>
-          <a:fontRef idx="minor">
-            <a:schemeClr val="lt1"/>
-          </a:fontRef>
-        </p:style>
-        <p:txBody>
-          <a:bodyPr rtlCol="0" anchor="ctr" anchorCtr="0"/>
-          <a:lstStyle/>
-          <a:p>
-            <a:pPr algn="ctr"/>
-            <a:r>
-              <a:rPr lang="en-US" altLang="ko-KR" dirty="0" smtClean="0">
-                <a:solidFill>
-                  <a:schemeClr val="tx1"/>
-                </a:solidFill>
-              </a:rPr>
-              <a:t>Screen Getter</a:t>
-            </a:r>
-            <a:endParaRPr lang="ko-KR" altLang="en-US" dirty="0">
-              <a:solidFill>
-                <a:schemeClr val="tx1"/>
-              </a:solidFill>
-            </a:endParaRPr>
-          </a:p>
-        </p:txBody>
-      </p:sp>
       <p:cxnSp>
         <p:nvCxnSpPr>
-          <p:cNvPr id="33" name="직선 화살표 연결선 32"/>
+          <p:cNvPr id="72" name="직선 화살표 연결선 71"/>
           <p:cNvCxnSpPr>
-            <a:stCxn id="32" idx="1"/>
-            <a:endCxn id="26" idx="3"/>
-          </p:cNvCxnSpPr>
-          <p:nvPr/>
-        </p:nvCxnSpPr>
-        <p:spPr>
-          <a:xfrm flipH="1">
-            <a:off x="2956270" y="2285594"/>
-            <a:ext cx="675176" cy="0"/>
-          </a:xfrm>
-          <a:prstGeom prst="straightConnector1">
-            <a:avLst/>
-          </a:prstGeom>
-          <a:ln w="25400">
-            <a:solidFill>
-              <a:schemeClr val="tx1"/>
-            </a:solidFill>
-            <a:headEnd type="arrow" w="lg" len="lg"/>
-            <a:tailEnd type="arrow" w="lg" len="lg"/>
-          </a:ln>
-        </p:spPr>
-        <p:style>
-          <a:lnRef idx="1">
-            <a:schemeClr val="accent1"/>
-          </a:lnRef>
-          <a:fillRef idx="0">
-            <a:schemeClr val="accent1"/>
-          </a:fillRef>
-          <a:effectRef idx="0">
-            <a:schemeClr val="accent1"/>
-          </a:effectRef>
-          <a:fontRef idx="minor">
-            <a:schemeClr val="tx1"/>
-          </a:fontRef>
-        </p:style>
-      </p:cxnSp>
-      <p:cxnSp>
-        <p:nvCxnSpPr>
-          <p:cNvPr id="34" name="직선 화살표 연결선 33"/>
-          <p:cNvCxnSpPr>
-            <a:stCxn id="29" idx="1"/>
-            <a:endCxn id="32" idx="3"/>
-          </p:cNvCxnSpPr>
-          <p:nvPr/>
-        </p:nvCxnSpPr>
-        <p:spPr>
-          <a:xfrm flipH="1">
-            <a:off x="5368538" y="2285594"/>
-            <a:ext cx="675176" cy="0"/>
-          </a:xfrm>
-          <a:prstGeom prst="straightConnector1">
-            <a:avLst/>
-          </a:prstGeom>
-          <a:ln w="25400">
-            <a:solidFill>
-              <a:schemeClr val="tx1"/>
-            </a:solidFill>
-            <a:headEnd type="arrow" w="lg" len="lg"/>
-            <a:tailEnd type="arrow" w="lg" len="lg"/>
-          </a:ln>
-        </p:spPr>
-        <p:style>
-          <a:lnRef idx="1">
-            <a:schemeClr val="accent1"/>
-          </a:lnRef>
-          <a:fillRef idx="0">
-            <a:schemeClr val="accent1"/>
-          </a:fillRef>
-          <a:effectRef idx="0">
-            <a:schemeClr val="accent1"/>
-          </a:effectRef>
-          <a:fontRef idx="minor">
-            <a:schemeClr val="tx1"/>
-          </a:fontRef>
-        </p:style>
-      </p:cxnSp>
-      <p:cxnSp>
-        <p:nvCxnSpPr>
-          <p:cNvPr id="35" name="직선 화살표 연결선 34"/>
-          <p:cNvCxnSpPr>
-            <a:stCxn id="31" idx="3"/>
-            <a:endCxn id="30" idx="1"/>
+            <a:stCxn id="19" idx="3"/>
           </p:cNvCxnSpPr>
           <p:nvPr/>
         </p:nvCxnSpPr>
         <p:spPr>
           <a:xfrm>
-            <a:off x="5368538" y="4621493"/>
-            <a:ext cx="675176" cy="0"/>
+            <a:off x="2956270" y="4163279"/>
+            <a:ext cx="3087444" cy="0"/>
           </a:xfrm>
           <a:prstGeom prst="straightConnector1">
             <a:avLst/>
@@ -6240,16 +5970,16 @@
       </p:cxnSp>
       <p:cxnSp>
         <p:nvCxnSpPr>
-          <p:cNvPr id="36" name="직선 화살표 연결선 35"/>
+          <p:cNvPr id="75" name="직선 화살표 연결선 74"/>
           <p:cNvCxnSpPr>
-            <a:stCxn id="25" idx="3"/>
+            <a:stCxn id="18" idx="3"/>
           </p:cNvCxnSpPr>
           <p:nvPr/>
         </p:nvCxnSpPr>
         <p:spPr>
           <a:xfrm>
-            <a:off x="2956270" y="4163279"/>
-            <a:ext cx="675176" cy="0"/>
+            <a:off x="2956270" y="5099383"/>
+            <a:ext cx="3087444" cy="0"/>
           </a:xfrm>
           <a:prstGeom prst="straightConnector1">
             <a:avLst/>
@@ -6279,16 +6009,17 @@
       </p:cxnSp>
       <p:cxnSp>
         <p:nvCxnSpPr>
-          <p:cNvPr id="37" name="직선 화살표 연결선 36"/>
+          <p:cNvPr id="22" name="직선 화살표 연결선 21"/>
           <p:cNvCxnSpPr>
-            <a:stCxn id="24" idx="3"/>
+            <a:stCxn id="55" idx="1"/>
+            <a:endCxn id="49" idx="3"/>
           </p:cNvCxnSpPr>
           <p:nvPr/>
         </p:nvCxnSpPr>
         <p:spPr>
-          <a:xfrm flipV="1">
-            <a:off x="2956270" y="5099382"/>
-            <a:ext cx="675176" cy="1"/>
+          <a:xfrm flipH="1">
+            <a:off x="2956270" y="2285594"/>
+            <a:ext cx="3087444" cy="0"/>
           </a:xfrm>
           <a:prstGeom prst="straightConnector1">
             <a:avLst/>
@@ -6319,7 +6050,7 @@
     </p:spTree>
     <p:extLst>
       <p:ext uri="{BB962C8B-B14F-4D97-AF65-F5344CB8AC3E}">
-        <p14:creationId xmlns:p14="http://schemas.microsoft.com/office/powerpoint/2010/main" val="1808660164"/>
+        <p14:creationId xmlns:p14="http://schemas.microsoft.com/office/powerpoint/2010/main" val="2126350262"/>
       </p:ext>
     </p:extLst>
   </p:cSld>

</xml_diff>